<commit_message>
added fighter-sprite to presentation
</commit_message>
<xml_diff>
--- a/Dokumente/kpmi_gr2_alpha.pptx
+++ b/Dokumente/kpmi_gr2_alpha.pptx
@@ -112,6 +112,11 @@
       </a:defRPr>
     </a:lvl9pPr>
   </p:defaultTextStyle>
+  <p:extLst>
+    <p:ext uri="{EFAFB233-063F-42B5-8137-9DF3F51BA10A}">
+      <p15:sldGuideLst xmlns:p15="http://schemas.microsoft.com/office/powerpoint/2012/main"/>
+    </p:ext>
+  </p:extLst>
 </p:presentation>
 </file>
 
@@ -3391,6 +3396,13 @@
         </dgm:presLayoutVars>
       </dgm:prSet>
       <dgm:spPr/>
+      <dgm:t>
+        <a:bodyPr/>
+        <a:lstStyle/>
+        <a:p>
+          <a:endParaRPr lang="de-DE"/>
+        </a:p>
+      </dgm:t>
     </dgm:pt>
     <dgm:pt modelId="{6FC9298D-2CC7-4AAB-B512-0C20F9EAF86F}" type="pres">
       <dgm:prSet presAssocID="{CA0F43C4-2DEA-4AD0-8673-A9868637C8EB}" presName="parentText" presStyleLbl="node1" presStyleIdx="0" presStyleCnt="3">
@@ -3400,6 +3412,13 @@
         </dgm:presLayoutVars>
       </dgm:prSet>
       <dgm:spPr/>
+      <dgm:t>
+        <a:bodyPr/>
+        <a:lstStyle/>
+        <a:p>
+          <a:endParaRPr lang="de-DE"/>
+        </a:p>
+      </dgm:t>
     </dgm:pt>
     <dgm:pt modelId="{D8233B84-B8AA-43FE-AA61-27A98AE50BF4}" type="pres">
       <dgm:prSet presAssocID="{46F331CD-5F1A-44B2-A7A4-39E3276AA387}" presName="spacer" presStyleCnt="0"/>
@@ -3413,6 +3432,13 @@
         </dgm:presLayoutVars>
       </dgm:prSet>
       <dgm:spPr/>
+      <dgm:t>
+        <a:bodyPr/>
+        <a:lstStyle/>
+        <a:p>
+          <a:endParaRPr lang="de-DE"/>
+        </a:p>
+      </dgm:t>
     </dgm:pt>
     <dgm:pt modelId="{4764C841-0A22-4DEB-BA1C-4292D23E9765}" type="pres">
       <dgm:prSet presAssocID="{E2D89148-3BC5-430F-B29E-1E3355B61F47}" presName="childText" presStyleLbl="revTx" presStyleIdx="0" presStyleCnt="2">
@@ -3421,6 +3447,13 @@
         </dgm:presLayoutVars>
       </dgm:prSet>
       <dgm:spPr/>
+      <dgm:t>
+        <a:bodyPr/>
+        <a:lstStyle/>
+        <a:p>
+          <a:endParaRPr lang="de-DE"/>
+        </a:p>
+      </dgm:t>
     </dgm:pt>
     <dgm:pt modelId="{FDAAD52F-DFBD-4D16-B914-28271FA6D135}" type="pres">
       <dgm:prSet presAssocID="{850CD563-4507-4652-B7BB-C2ED3A4C2C78}" presName="parentText" presStyleLbl="node1" presStyleIdx="2" presStyleCnt="3">
@@ -3430,6 +3463,13 @@
         </dgm:presLayoutVars>
       </dgm:prSet>
       <dgm:spPr/>
+      <dgm:t>
+        <a:bodyPr/>
+        <a:lstStyle/>
+        <a:p>
+          <a:endParaRPr lang="de-DE"/>
+        </a:p>
+      </dgm:t>
     </dgm:pt>
     <dgm:pt modelId="{39503DF7-D5E4-4C49-BB79-2EAC1C671572}" type="pres">
       <dgm:prSet presAssocID="{850CD563-4507-4652-B7BB-C2ED3A4C2C78}" presName="childText" presStyleLbl="revTx" presStyleIdx="1" presStyleCnt="2">
@@ -3438,6 +3478,13 @@
         </dgm:presLayoutVars>
       </dgm:prSet>
       <dgm:spPr/>
+      <dgm:t>
+        <a:bodyPr/>
+        <a:lstStyle/>
+        <a:p>
+          <a:endParaRPr lang="de-DE"/>
+        </a:p>
+      </dgm:t>
     </dgm:pt>
   </dgm:ptLst>
   <dgm:cxnLst>
@@ -3787,6 +3834,13 @@
         </dgm:presLayoutVars>
       </dgm:prSet>
       <dgm:spPr/>
+      <dgm:t>
+        <a:bodyPr/>
+        <a:lstStyle/>
+        <a:p>
+          <a:endParaRPr lang="de-DE"/>
+        </a:p>
+      </dgm:t>
     </dgm:pt>
     <dgm:pt modelId="{2D61DBCF-6287-44DA-A275-8F5D8F9FA325}" type="pres">
       <dgm:prSet presAssocID="{99A1590F-8B63-43D5-88BE-F2C6CE48541B}" presName="parentText" presStyleLbl="node1" presStyleIdx="0" presStyleCnt="2">
@@ -3796,6 +3850,13 @@
         </dgm:presLayoutVars>
       </dgm:prSet>
       <dgm:spPr/>
+      <dgm:t>
+        <a:bodyPr/>
+        <a:lstStyle/>
+        <a:p>
+          <a:endParaRPr lang="de-DE"/>
+        </a:p>
+      </dgm:t>
     </dgm:pt>
     <dgm:pt modelId="{CBA7FB57-29F7-4941-9259-633B0B64FD75}" type="pres">
       <dgm:prSet presAssocID="{99A1590F-8B63-43D5-88BE-F2C6CE48541B}" presName="childText" presStyleLbl="revTx" presStyleIdx="0" presStyleCnt="2">
@@ -3804,6 +3865,13 @@
         </dgm:presLayoutVars>
       </dgm:prSet>
       <dgm:spPr/>
+      <dgm:t>
+        <a:bodyPr/>
+        <a:lstStyle/>
+        <a:p>
+          <a:endParaRPr lang="de-DE"/>
+        </a:p>
+      </dgm:t>
     </dgm:pt>
     <dgm:pt modelId="{F7C5E172-A3DF-4CE1-BF8C-187DC3CEF56B}" type="pres">
       <dgm:prSet presAssocID="{1D4ECDDA-3746-4B7B-897A-574AD2E1FDD3}" presName="parentText" presStyleLbl="node1" presStyleIdx="1" presStyleCnt="2">
@@ -3813,6 +3881,13 @@
         </dgm:presLayoutVars>
       </dgm:prSet>
       <dgm:spPr/>
+      <dgm:t>
+        <a:bodyPr/>
+        <a:lstStyle/>
+        <a:p>
+          <a:endParaRPr lang="de-DE"/>
+        </a:p>
+      </dgm:t>
     </dgm:pt>
     <dgm:pt modelId="{C22EFD4B-AE8B-4F12-88CC-8D6BC7BEF99D}" type="pres">
       <dgm:prSet presAssocID="{1D4ECDDA-3746-4B7B-897A-574AD2E1FDD3}" presName="childText" presStyleLbl="revTx" presStyleIdx="1" presStyleCnt="2">
@@ -3821,6 +3896,13 @@
         </dgm:presLayoutVars>
       </dgm:prSet>
       <dgm:spPr/>
+      <dgm:t>
+        <a:bodyPr/>
+        <a:lstStyle/>
+        <a:p>
+          <a:endParaRPr lang="de-DE"/>
+        </a:p>
+      </dgm:t>
     </dgm:pt>
   </dgm:ptLst>
   <dgm:cxnLst>
@@ -3829,8 +3911,8 @@
     <dgm:cxn modelId="{049F486D-68EC-438E-83A4-C9B3DDA7DD64}" type="presOf" srcId="{9A64B3CA-37E4-4DA9-89D7-1CED65D78B2E}" destId="{C22EFD4B-AE8B-4F12-88CC-8D6BC7BEF99D}" srcOrd="0" destOrd="0" presId="urn:microsoft.com/office/officeart/2005/8/layout/vList2"/>
     <dgm:cxn modelId="{57986A8C-51D6-47F0-BE61-75C6BCAF40BE}" srcId="{99A1590F-8B63-43D5-88BE-F2C6CE48541B}" destId="{4DFA3048-020D-4EEE-9A16-92B1A5E39ADA}" srcOrd="0" destOrd="0" parTransId="{72426658-1255-47DD-BF89-2C91781C6D90}" sibTransId="{3716D55D-97C4-4DA8-B103-F5E482F8EB74}"/>
     <dgm:cxn modelId="{0D5CAB09-61DF-4396-A6DC-B6BAD26B82C0}" type="presOf" srcId="{99A1590F-8B63-43D5-88BE-F2C6CE48541B}" destId="{2D61DBCF-6287-44DA-A275-8F5D8F9FA325}" srcOrd="0" destOrd="0" presId="urn:microsoft.com/office/officeart/2005/8/layout/vList2"/>
+    <dgm:cxn modelId="{513185DC-498C-41EC-8473-DB15DB65C361}" srcId="{99A1590F-8B63-43D5-88BE-F2C6CE48541B}" destId="{929B22C3-EFCE-4E7D-B38B-74FDF5FD5842}" srcOrd="2" destOrd="0" parTransId="{0888EA67-BBFD-43BE-AF91-5F09400A8A0C}" sibTransId="{64551957-E045-4C4B-8DAE-C23D200760F3}"/>
     <dgm:cxn modelId="{0CAFF6CF-09EC-470C-961A-B33D44849BA3}" type="presOf" srcId="{4DFA3048-020D-4EEE-9A16-92B1A5E39ADA}" destId="{CBA7FB57-29F7-4941-9259-633B0B64FD75}" srcOrd="0" destOrd="0" presId="urn:microsoft.com/office/officeart/2005/8/layout/vList2"/>
-    <dgm:cxn modelId="{513185DC-498C-41EC-8473-DB15DB65C361}" srcId="{99A1590F-8B63-43D5-88BE-F2C6CE48541B}" destId="{929B22C3-EFCE-4E7D-B38B-74FDF5FD5842}" srcOrd="2" destOrd="0" parTransId="{0888EA67-BBFD-43BE-AF91-5F09400A8A0C}" sibTransId="{64551957-E045-4C4B-8DAE-C23D200760F3}"/>
     <dgm:cxn modelId="{986FEB12-6AF2-45E8-85F0-EF9820EA621D}" type="presOf" srcId="{5418CFFD-9537-426E-9CDF-A81DABF149EE}" destId="{CBA7FB57-29F7-4941-9259-633B0B64FD75}" srcOrd="0" destOrd="4" presId="urn:microsoft.com/office/officeart/2005/8/layout/vList2"/>
     <dgm:cxn modelId="{D0C9F784-BE99-4CCD-8778-9B75757BAF08}" type="presOf" srcId="{60FCC51E-FBAF-4011-B790-8067F66FED4A}" destId="{CBA7FB57-29F7-4941-9259-633B0B64FD75}" srcOrd="0" destOrd="1" presId="urn:microsoft.com/office/officeart/2005/8/layout/vList2"/>
     <dgm:cxn modelId="{71CAE84A-9100-46ED-9F85-B6FD6D84A3B4}" type="presOf" srcId="{34ED2638-81B0-4DE6-B74B-AA9D6AFF0A43}" destId="{CBA7FB57-29F7-4941-9259-633B0B64FD75}" srcOrd="0" destOrd="3" presId="urn:microsoft.com/office/officeart/2005/8/layout/vList2"/>
@@ -3992,6 +4074,13 @@
         </dgm:presLayoutVars>
       </dgm:prSet>
       <dgm:spPr/>
+      <dgm:t>
+        <a:bodyPr/>
+        <a:lstStyle/>
+        <a:p>
+          <a:endParaRPr lang="de-DE"/>
+        </a:p>
+      </dgm:t>
     </dgm:pt>
     <dgm:pt modelId="{D5318855-1553-4093-A35D-493FAA4E6D27}" type="pres">
       <dgm:prSet presAssocID="{21E36325-76A4-4E55-A3F7-7B9361AD520A}" presName="parentText" presStyleLbl="node1" presStyleIdx="0" presStyleCnt="1">
@@ -4001,6 +4090,13 @@
         </dgm:presLayoutVars>
       </dgm:prSet>
       <dgm:spPr/>
+      <dgm:t>
+        <a:bodyPr/>
+        <a:lstStyle/>
+        <a:p>
+          <a:endParaRPr lang="de-DE"/>
+        </a:p>
+      </dgm:t>
     </dgm:pt>
     <dgm:pt modelId="{309C2005-2F6C-41E9-A3BC-333DD8BA4EAB}" type="pres">
       <dgm:prSet presAssocID="{21E36325-76A4-4E55-A3F7-7B9361AD520A}" presName="childText" presStyleLbl="revTx" presStyleIdx="0" presStyleCnt="1">
@@ -4009,6 +4105,13 @@
         </dgm:presLayoutVars>
       </dgm:prSet>
       <dgm:spPr/>
+      <dgm:t>
+        <a:bodyPr/>
+        <a:lstStyle/>
+        <a:p>
+          <a:endParaRPr lang="de-DE"/>
+        </a:p>
+      </dgm:t>
     </dgm:pt>
   </dgm:ptLst>
   <dgm:cxnLst>
@@ -4374,6 +4477,13 @@
         </dgm:presLayoutVars>
       </dgm:prSet>
       <dgm:spPr/>
+      <dgm:t>
+        <a:bodyPr/>
+        <a:lstStyle/>
+        <a:p>
+          <a:endParaRPr lang="de-DE"/>
+        </a:p>
+      </dgm:t>
     </dgm:pt>
     <dgm:pt modelId="{FC4ED248-5736-4DB0-B62A-B1EA3BE68CAD}" type="pres">
       <dgm:prSet presAssocID="{F9A622AC-11AB-4E71-B5D6-899F8975F473}" presName="parentText" presStyleLbl="node1" presStyleIdx="0" presStyleCnt="5">
@@ -4383,6 +4493,13 @@
         </dgm:presLayoutVars>
       </dgm:prSet>
       <dgm:spPr/>
+      <dgm:t>
+        <a:bodyPr/>
+        <a:lstStyle/>
+        <a:p>
+          <a:endParaRPr lang="de-DE"/>
+        </a:p>
+      </dgm:t>
     </dgm:pt>
     <dgm:pt modelId="{BBD9D681-80D7-4383-BF6C-81DDBD848DBD}" type="pres">
       <dgm:prSet presAssocID="{F9A622AC-11AB-4E71-B5D6-899F8975F473}" presName="childText" presStyleLbl="revTx" presStyleIdx="0" presStyleCnt="3">
@@ -4407,6 +4524,13 @@
         </dgm:presLayoutVars>
       </dgm:prSet>
       <dgm:spPr/>
+      <dgm:t>
+        <a:bodyPr/>
+        <a:lstStyle/>
+        <a:p>
+          <a:endParaRPr lang="de-DE"/>
+        </a:p>
+      </dgm:t>
     </dgm:pt>
     <dgm:pt modelId="{D74A3BA3-C77C-4E44-B5A2-B85A421BC6BD}" type="pres">
       <dgm:prSet presAssocID="{E4C93D71-24C3-4409-818C-F05F1411877B}" presName="spacer" presStyleCnt="0"/>
@@ -4420,6 +4544,13 @@
         </dgm:presLayoutVars>
       </dgm:prSet>
       <dgm:spPr/>
+      <dgm:t>
+        <a:bodyPr/>
+        <a:lstStyle/>
+        <a:p>
+          <a:endParaRPr lang="de-DE"/>
+        </a:p>
+      </dgm:t>
     </dgm:pt>
     <dgm:pt modelId="{A2E0D781-6B9A-4BEE-86C2-A5B8551F1580}" type="pres">
       <dgm:prSet presAssocID="{2A4DC3FE-ADAA-4C8F-9925-33B3EEB7A5B8}" presName="childText" presStyleLbl="revTx" presStyleIdx="1" presStyleCnt="3">
@@ -4428,6 +4559,13 @@
         </dgm:presLayoutVars>
       </dgm:prSet>
       <dgm:spPr/>
+      <dgm:t>
+        <a:bodyPr/>
+        <a:lstStyle/>
+        <a:p>
+          <a:endParaRPr lang="de-DE"/>
+        </a:p>
+      </dgm:t>
     </dgm:pt>
     <dgm:pt modelId="{D5E6C069-C70E-467F-A16C-5641B77D931F}" type="pres">
       <dgm:prSet presAssocID="{E72A1195-9E14-4992-B19F-EFBE9DC6D5A9}" presName="parentText" presStyleLbl="node1" presStyleIdx="3" presStyleCnt="5">
@@ -4437,6 +4575,13 @@
         </dgm:presLayoutVars>
       </dgm:prSet>
       <dgm:spPr/>
+      <dgm:t>
+        <a:bodyPr/>
+        <a:lstStyle/>
+        <a:p>
+          <a:endParaRPr lang="de-DE"/>
+        </a:p>
+      </dgm:t>
     </dgm:pt>
     <dgm:pt modelId="{8E487B19-7006-4F02-ACDC-6488907EB283}" type="pres">
       <dgm:prSet presAssocID="{E22D9A28-EB17-4C38-92A5-E5905E2595A7}" presName="spacer" presStyleCnt="0"/>
@@ -4450,6 +4595,13 @@
         </dgm:presLayoutVars>
       </dgm:prSet>
       <dgm:spPr/>
+      <dgm:t>
+        <a:bodyPr/>
+        <a:lstStyle/>
+        <a:p>
+          <a:endParaRPr lang="de-DE"/>
+        </a:p>
+      </dgm:t>
     </dgm:pt>
     <dgm:pt modelId="{5385B8CC-9149-4924-B86F-AEBCEB168816}" type="pres">
       <dgm:prSet presAssocID="{4C8C451F-A19D-4945-B319-8BB2EE3A6650}" presName="childText" presStyleLbl="revTx" presStyleIdx="2" presStyleCnt="3">
@@ -4458,26 +4610,33 @@
         </dgm:presLayoutVars>
       </dgm:prSet>
       <dgm:spPr/>
+      <dgm:t>
+        <a:bodyPr/>
+        <a:lstStyle/>
+        <a:p>
+          <a:endParaRPr lang="de-DE"/>
+        </a:p>
+      </dgm:t>
     </dgm:pt>
   </dgm:ptLst>
   <dgm:cxnLst>
+    <dgm:cxn modelId="{775D98C4-4FA3-4440-AD27-F447E2B33AD2}" srcId="{4C8C451F-A19D-4945-B319-8BB2EE3A6650}" destId="{FDAD018A-4C45-4F9C-ABA1-004C1D230FE8}" srcOrd="0" destOrd="0" parTransId="{15EF514A-ADFD-404B-A919-A52F2994B1BF}" sibTransId="{45A76486-72D5-43C7-825F-94D488D1133E}"/>
+    <dgm:cxn modelId="{F649422F-9952-4E45-ABFB-AA0C48749BB3}" srcId="{F8777D79-2153-4A0B-B6EA-DF341FF64042}" destId="{F9A622AC-11AB-4E71-B5D6-899F8975F473}" srcOrd="0" destOrd="0" parTransId="{5F3C70D1-2465-4ED3-B135-1CF5BC192727}" sibTransId="{28812FA1-7156-4086-AC5E-1EE7FD4F1135}"/>
+    <dgm:cxn modelId="{AF9DA0EC-993A-40F8-BFE0-B2C756E65A30}" type="presOf" srcId="{2A4DC3FE-ADAA-4C8F-9925-33B3EEB7A5B8}" destId="{D61A3093-CB96-44CE-AD7C-7B2A11DF39D2}" srcOrd="0" destOrd="0" presId="urn:microsoft.com/office/officeart/2005/8/layout/vList2"/>
+    <dgm:cxn modelId="{B3C54D20-8913-4EC5-B5B3-0468A9771705}" type="presOf" srcId="{CAB2243D-53AC-4823-83AC-2D2F611BD007}" destId="{ABBAE143-DEBA-49D1-B08D-DEAF6EA4C947}" srcOrd="0" destOrd="0" presId="urn:microsoft.com/office/officeart/2005/8/layout/vList2"/>
+    <dgm:cxn modelId="{CB6DDE31-1696-4719-AB5E-D938181461E8}" srcId="{F8777D79-2153-4A0B-B6EA-DF341FF64042}" destId="{E72A1195-9E14-4992-B19F-EFBE9DC6D5A9}" srcOrd="3" destOrd="0" parTransId="{439F3F1E-44A1-4773-9D40-ED7AFE994723}" sibTransId="{E22D9A28-EB17-4C38-92A5-E5905E2595A7}"/>
+    <dgm:cxn modelId="{7183E576-604F-4B90-8928-4004966F599C}" srcId="{2A4DC3FE-ADAA-4C8F-9925-33B3EEB7A5B8}" destId="{4DCEAA52-62D4-4B8A-9F40-697B4675C878}" srcOrd="0" destOrd="0" parTransId="{4A3A438B-7319-44BA-BE0E-418631FB7E1E}" sibTransId="{5883B5F8-AB21-4861-ADB3-DA0DDDD89F4E}"/>
+    <dgm:cxn modelId="{C385BE5A-F015-4A01-9797-CB1F6703098B}" type="presOf" srcId="{4DCEAA52-62D4-4B8A-9F40-697B4675C878}" destId="{A2E0D781-6B9A-4BEE-86C2-A5B8551F1580}" srcOrd="0" destOrd="0" presId="urn:microsoft.com/office/officeart/2005/8/layout/vList2"/>
+    <dgm:cxn modelId="{99AA0D47-63C1-4068-AD34-E537CF7C8BF5}" srcId="{F9A622AC-11AB-4E71-B5D6-899F8975F473}" destId="{B26B18A2-B4D2-4533-834D-0FB4FB381FBD}" srcOrd="0" destOrd="0" parTransId="{9DCA1E16-DB42-43E0-8BAA-B8ED88DA9B0C}" sibTransId="{61A89069-C140-4523-A53E-2D35F9D60FE0}"/>
+    <dgm:cxn modelId="{DA2A2DB6-84AF-41FF-8126-5E1E75ABAA40}" srcId="{F8777D79-2153-4A0B-B6EA-DF341FF64042}" destId="{4C8C451F-A19D-4945-B319-8BB2EE3A6650}" srcOrd="4" destOrd="0" parTransId="{21E59661-8330-4DF8-BDCA-FD90C8BD287A}" sibTransId="{6AF2AB0D-1364-40E3-9DE7-31F4D26CC55D}"/>
+    <dgm:cxn modelId="{7D874210-CA94-43AB-87B8-0910A5625D0B}" type="presOf" srcId="{B26B18A2-B4D2-4533-834D-0FB4FB381FBD}" destId="{BBD9D681-80D7-4383-BF6C-81DDBD848DBD}" srcOrd="0" destOrd="0" presId="urn:microsoft.com/office/officeart/2005/8/layout/vList2"/>
+    <dgm:cxn modelId="{00EA8A38-7D9E-45FB-A18B-530FFAD3B700}" srcId="{F8777D79-2153-4A0B-B6EA-DF341FF64042}" destId="{2A4DC3FE-ADAA-4C8F-9925-33B3EEB7A5B8}" srcOrd="2" destOrd="0" parTransId="{C9F49E2A-133B-430D-B00D-62F8826A5B0A}" sibTransId="{4B290306-BF43-40F8-8992-6B8553620F25}"/>
+    <dgm:cxn modelId="{7CF65680-0AB8-4BF7-A6EC-C1481054AD29}" srcId="{F8777D79-2153-4A0B-B6EA-DF341FF64042}" destId="{CAB2243D-53AC-4823-83AC-2D2F611BD007}" srcOrd="1" destOrd="0" parTransId="{44257397-9220-4BB0-8EB4-9D94965986B7}" sibTransId="{E4C93D71-24C3-4409-818C-F05F1411877B}"/>
+    <dgm:cxn modelId="{59AD06F1-0181-4258-9790-9495C0F2C274}" type="presOf" srcId="{F9A622AC-11AB-4E71-B5D6-899F8975F473}" destId="{FC4ED248-5736-4DB0-B62A-B1EA3BE68CAD}" srcOrd="0" destOrd="0" presId="urn:microsoft.com/office/officeart/2005/8/layout/vList2"/>
+    <dgm:cxn modelId="{80F2E4F9-AC71-4F6C-8E00-7E2B2DCAE92E}" type="presOf" srcId="{FDAD018A-4C45-4F9C-ABA1-004C1D230FE8}" destId="{5385B8CC-9149-4924-B86F-AEBCEB168816}" srcOrd="0" destOrd="0" presId="urn:microsoft.com/office/officeart/2005/8/layout/vList2"/>
+    <dgm:cxn modelId="{B0B282B1-62E7-49C3-8188-0FA796BB3BF7}" type="presOf" srcId="{4C8C451F-A19D-4945-B319-8BB2EE3A6650}" destId="{ABFA25A1-E747-4BAF-AEC5-51323DB326D8}" srcOrd="0" destOrd="0" presId="urn:microsoft.com/office/officeart/2005/8/layout/vList2"/>
+    <dgm:cxn modelId="{A75DF679-6919-40F7-B1D4-085EBFFE3C79}" type="presOf" srcId="{E72A1195-9E14-4992-B19F-EFBE9DC6D5A9}" destId="{D5E6C069-C70E-467F-A16C-5641B77D931F}" srcOrd="0" destOrd="0" presId="urn:microsoft.com/office/officeart/2005/8/layout/vList2"/>
     <dgm:cxn modelId="{52CD80B1-899A-4C40-9AED-B9BCC817B914}" type="presOf" srcId="{F8777D79-2153-4A0B-B6EA-DF341FF64042}" destId="{8A2C9C8A-3D81-4BF8-9F70-7144C057E7B4}" srcOrd="0" destOrd="0" presId="urn:microsoft.com/office/officeart/2005/8/layout/vList2"/>
-    <dgm:cxn modelId="{7D874210-CA94-43AB-87B8-0910A5625D0B}" type="presOf" srcId="{B26B18A2-B4D2-4533-834D-0FB4FB381FBD}" destId="{BBD9D681-80D7-4383-BF6C-81DDBD848DBD}" srcOrd="0" destOrd="0" presId="urn:microsoft.com/office/officeart/2005/8/layout/vList2"/>
-    <dgm:cxn modelId="{AF9DA0EC-993A-40F8-BFE0-B2C756E65A30}" type="presOf" srcId="{2A4DC3FE-ADAA-4C8F-9925-33B3EEB7A5B8}" destId="{D61A3093-CB96-44CE-AD7C-7B2A11DF39D2}" srcOrd="0" destOrd="0" presId="urn:microsoft.com/office/officeart/2005/8/layout/vList2"/>
-    <dgm:cxn modelId="{7CF65680-0AB8-4BF7-A6EC-C1481054AD29}" srcId="{F8777D79-2153-4A0B-B6EA-DF341FF64042}" destId="{CAB2243D-53AC-4823-83AC-2D2F611BD007}" srcOrd="1" destOrd="0" parTransId="{44257397-9220-4BB0-8EB4-9D94965986B7}" sibTransId="{E4C93D71-24C3-4409-818C-F05F1411877B}"/>
-    <dgm:cxn modelId="{775D98C4-4FA3-4440-AD27-F447E2B33AD2}" srcId="{4C8C451F-A19D-4945-B319-8BB2EE3A6650}" destId="{FDAD018A-4C45-4F9C-ABA1-004C1D230FE8}" srcOrd="0" destOrd="0" parTransId="{15EF514A-ADFD-404B-A919-A52F2994B1BF}" sibTransId="{45A76486-72D5-43C7-825F-94D488D1133E}"/>
-    <dgm:cxn modelId="{80F2E4F9-AC71-4F6C-8E00-7E2B2DCAE92E}" type="presOf" srcId="{FDAD018A-4C45-4F9C-ABA1-004C1D230FE8}" destId="{5385B8CC-9149-4924-B86F-AEBCEB168816}" srcOrd="0" destOrd="0" presId="urn:microsoft.com/office/officeart/2005/8/layout/vList2"/>
-    <dgm:cxn modelId="{00EA8A38-7D9E-45FB-A18B-530FFAD3B700}" srcId="{F8777D79-2153-4A0B-B6EA-DF341FF64042}" destId="{2A4DC3FE-ADAA-4C8F-9925-33B3EEB7A5B8}" srcOrd="2" destOrd="0" parTransId="{C9F49E2A-133B-430D-B00D-62F8826A5B0A}" sibTransId="{4B290306-BF43-40F8-8992-6B8553620F25}"/>
-    <dgm:cxn modelId="{7183E576-604F-4B90-8928-4004966F599C}" srcId="{2A4DC3FE-ADAA-4C8F-9925-33B3EEB7A5B8}" destId="{4DCEAA52-62D4-4B8A-9F40-697B4675C878}" srcOrd="0" destOrd="0" parTransId="{4A3A438B-7319-44BA-BE0E-418631FB7E1E}" sibTransId="{5883B5F8-AB21-4861-ADB3-DA0DDDD89F4E}"/>
-    <dgm:cxn modelId="{DA2A2DB6-84AF-41FF-8126-5E1E75ABAA40}" srcId="{F8777D79-2153-4A0B-B6EA-DF341FF64042}" destId="{4C8C451F-A19D-4945-B319-8BB2EE3A6650}" srcOrd="4" destOrd="0" parTransId="{21E59661-8330-4DF8-BDCA-FD90C8BD287A}" sibTransId="{6AF2AB0D-1364-40E3-9DE7-31F4D26CC55D}"/>
-    <dgm:cxn modelId="{99AA0D47-63C1-4068-AD34-E537CF7C8BF5}" srcId="{F9A622AC-11AB-4E71-B5D6-899F8975F473}" destId="{B26B18A2-B4D2-4533-834D-0FB4FB381FBD}" srcOrd="0" destOrd="0" parTransId="{9DCA1E16-DB42-43E0-8BAA-B8ED88DA9B0C}" sibTransId="{61A89069-C140-4523-A53E-2D35F9D60FE0}"/>
-    <dgm:cxn modelId="{B0B282B1-62E7-49C3-8188-0FA796BB3BF7}" type="presOf" srcId="{4C8C451F-A19D-4945-B319-8BB2EE3A6650}" destId="{ABFA25A1-E747-4BAF-AEC5-51323DB326D8}" srcOrd="0" destOrd="0" presId="urn:microsoft.com/office/officeart/2005/8/layout/vList2"/>
-    <dgm:cxn modelId="{B3C54D20-8913-4EC5-B5B3-0468A9771705}" type="presOf" srcId="{CAB2243D-53AC-4823-83AC-2D2F611BD007}" destId="{ABBAE143-DEBA-49D1-B08D-DEAF6EA4C947}" srcOrd="0" destOrd="0" presId="urn:microsoft.com/office/officeart/2005/8/layout/vList2"/>
-    <dgm:cxn modelId="{C385BE5A-F015-4A01-9797-CB1F6703098B}" type="presOf" srcId="{4DCEAA52-62D4-4B8A-9F40-697B4675C878}" destId="{A2E0D781-6B9A-4BEE-86C2-A5B8551F1580}" srcOrd="0" destOrd="0" presId="urn:microsoft.com/office/officeart/2005/8/layout/vList2"/>
-    <dgm:cxn modelId="{F649422F-9952-4E45-ABFB-AA0C48749BB3}" srcId="{F8777D79-2153-4A0B-B6EA-DF341FF64042}" destId="{F9A622AC-11AB-4E71-B5D6-899F8975F473}" srcOrd="0" destOrd="0" parTransId="{5F3C70D1-2465-4ED3-B135-1CF5BC192727}" sibTransId="{28812FA1-7156-4086-AC5E-1EE7FD4F1135}"/>
-    <dgm:cxn modelId="{A75DF679-6919-40F7-B1D4-085EBFFE3C79}" type="presOf" srcId="{E72A1195-9E14-4992-B19F-EFBE9DC6D5A9}" destId="{D5E6C069-C70E-467F-A16C-5641B77D931F}" srcOrd="0" destOrd="0" presId="urn:microsoft.com/office/officeart/2005/8/layout/vList2"/>
-    <dgm:cxn modelId="{CB6DDE31-1696-4719-AB5E-D938181461E8}" srcId="{F8777D79-2153-4A0B-B6EA-DF341FF64042}" destId="{E72A1195-9E14-4992-B19F-EFBE9DC6D5A9}" srcOrd="3" destOrd="0" parTransId="{439F3F1E-44A1-4773-9D40-ED7AFE994723}" sibTransId="{E22D9A28-EB17-4C38-92A5-E5905E2595A7}"/>
-    <dgm:cxn modelId="{59AD06F1-0181-4258-9790-9495C0F2C274}" type="presOf" srcId="{F9A622AC-11AB-4E71-B5D6-899F8975F473}" destId="{FC4ED248-5736-4DB0-B62A-B1EA3BE68CAD}" srcOrd="0" destOrd="0" presId="urn:microsoft.com/office/officeart/2005/8/layout/vList2"/>
     <dgm:cxn modelId="{AA8C60EA-2532-4726-8998-57B306DC48B0}" type="presParOf" srcId="{8A2C9C8A-3D81-4BF8-9F70-7144C057E7B4}" destId="{FC4ED248-5736-4DB0-B62A-B1EA3BE68CAD}" srcOrd="0" destOrd="0" presId="urn:microsoft.com/office/officeart/2005/8/layout/vList2"/>
     <dgm:cxn modelId="{FF4397B6-AD14-4537-BC9B-1240CA3BB65F}" type="presParOf" srcId="{8A2C9C8A-3D81-4BF8-9F70-7144C057E7B4}" destId="{BBD9D681-80D7-4383-BF6C-81DDBD848DBD}" srcOrd="1" destOrd="0" presId="urn:microsoft.com/office/officeart/2005/8/layout/vList2"/>
     <dgm:cxn modelId="{0A5BBD97-B3C4-43FF-99D8-094B4368B91F}" type="presParOf" srcId="{8A2C9C8A-3D81-4BF8-9F70-7144C057E7B4}" destId="{ABBAE143-DEBA-49D1-B08D-DEAF6EA4C947}" srcOrd="2" destOrd="0" presId="urn:microsoft.com/office/officeart/2005/8/layout/vList2"/>
@@ -15425,7 +15584,7 @@
             <p:ph idx="1"/>
             <p:extLst>
               <p:ext uri="{D42A27DB-BD31-4B8C-83A1-F6EECF244321}">
-                <p14:modId xmlns:p14="http://schemas.microsoft.com/office/powerpoint/2010/main" val="2172825367"/>
+                <p14:modId xmlns:p14="http://schemas.microsoft.com/office/powerpoint/2010/main" val="735235298"/>
               </p:ext>
             </p:extLst>
           </p:nvPr>
@@ -15554,6 +15713,36 @@
           <a:xfrm>
             <a:off x="6442811" y="3070785"/>
             <a:ext cx="493287" cy="616607"/>
+          </a:xfrm>
+          <a:prstGeom prst="rect">
+            <a:avLst/>
+          </a:prstGeom>
+        </p:spPr>
+      </p:pic>
+      <p:pic>
+        <p:nvPicPr>
+          <p:cNvPr id="3" name="Grafik 2"/>
+          <p:cNvPicPr>
+            <a:picLocks noChangeAspect="1"/>
+          </p:cNvPicPr>
+          <p:nvPr/>
+        </p:nvPicPr>
+        <p:blipFill>
+          <a:blip r:embed="rId11">
+            <a:extLst>
+              <a:ext uri="{28A0092B-C50C-407E-A947-70E740481C1C}">
+                <a14:useLocalDpi xmlns:a14="http://schemas.microsoft.com/office/drawing/2010/main" val="0"/>
+              </a:ext>
+            </a:extLst>
+          </a:blip>
+          <a:stretch>
+            <a:fillRect/>
+          </a:stretch>
+        </p:blipFill>
+        <p:spPr>
+          <a:xfrm>
+            <a:off x="9426801" y="3606749"/>
+            <a:ext cx="575420" cy="647348"/>
           </a:xfrm>
           <a:prstGeom prst="rect">
             <a:avLst/>

</xml_diff>